<commit_message>
Commit for SQL Quiz Exercise
</commit_message>
<xml_diff>
--- a/relational-databases-and-sql/PPT_Transactions.pptx
+++ b/relational-databases-and-sql/PPT_Transactions.pptx
@@ -8,13 +8,12 @@
     <p:sldId id="256" r:id="rId2"/>
     <p:sldId id="257" r:id="rId3"/>
     <p:sldId id="259" r:id="rId4"/>
-    <p:sldId id="258" r:id="rId5"/>
-    <p:sldId id="260" r:id="rId6"/>
-    <p:sldId id="261" r:id="rId7"/>
-    <p:sldId id="262" r:id="rId8"/>
-    <p:sldId id="264" r:id="rId9"/>
-    <p:sldId id="265" r:id="rId10"/>
-    <p:sldId id="263" r:id="rId11"/>
+    <p:sldId id="260" r:id="rId5"/>
+    <p:sldId id="261" r:id="rId6"/>
+    <p:sldId id="262" r:id="rId7"/>
+    <p:sldId id="264" r:id="rId8"/>
+    <p:sldId id="265" r:id="rId9"/>
+    <p:sldId id="263" r:id="rId10"/>
   </p:sldIdLst>
   <p:sldSz cx="12192000" cy="6858000"/>
   <p:notesSz cx="6858000" cy="9144000"/>
@@ -113,6 +112,11 @@
       </a:defRPr>
     </a:lvl9pPr>
   </p:defaultTextStyle>
+  <p:extLst>
+    <p:ext uri="{EFAFB233-063F-42B5-8137-9DF3F51BA10A}">
+      <p15:sldGuideLst xmlns:p15="http://schemas.microsoft.com/office/powerpoint/2012/main"/>
+    </p:ext>
+  </p:extLst>
 </p:presentation>
 </file>
 
@@ -9514,7 +9518,7 @@
             <a:fld id="{B61BEF0D-F0BB-DE4B-95CE-6DB70DBA9567}" type="datetimeFigureOut">
               <a:rPr lang="en-US" dirty="0"/>
               <a:pPr/>
-              <a:t>8/3/22</a:t>
+              <a:t>8/4/22</a:t>
             </a:fld>
             <a:endParaRPr lang="en-US" dirty="0"/>
           </a:p>
@@ -9773,7 +9777,7 @@
             <a:fld id="{B61BEF0D-F0BB-DE4B-95CE-6DB70DBA9567}" type="datetimeFigureOut">
               <a:rPr lang="en-US" dirty="0"/>
               <a:pPr/>
-              <a:t>8/3/22</a:t>
+              <a:t>8/4/22</a:t>
             </a:fld>
             <a:endParaRPr lang="en-US" dirty="0"/>
           </a:p>
@@ -10005,7 +10009,7 @@
             <a:fld id="{B61BEF0D-F0BB-DE4B-95CE-6DB70DBA9567}" type="datetimeFigureOut">
               <a:rPr lang="en-US" dirty="0"/>
               <a:pPr/>
-              <a:t>8/3/22</a:t>
+              <a:t>8/4/22</a:t>
             </a:fld>
             <a:endParaRPr lang="en-US" dirty="0"/>
           </a:p>
@@ -10242,7 +10246,7 @@
             <a:fld id="{B61BEF0D-F0BB-DE4B-95CE-6DB70DBA9567}" type="datetimeFigureOut">
               <a:rPr lang="en-US" dirty="0"/>
               <a:pPr/>
-              <a:t>8/3/22</a:t>
+              <a:t>8/4/22</a:t>
             </a:fld>
             <a:endParaRPr lang="en-US" dirty="0"/>
           </a:p>
@@ -10546,7 +10550,7 @@
             <a:fld id="{B61BEF0D-F0BB-DE4B-95CE-6DB70DBA9567}" type="datetimeFigureOut">
               <a:rPr lang="en-US" dirty="0"/>
               <a:pPr/>
-              <a:t>8/3/22</a:t>
+              <a:t>8/4/22</a:t>
             </a:fld>
             <a:endParaRPr lang="en-US" dirty="0"/>
           </a:p>
@@ -10845,7 +10849,7 @@
             <a:fld id="{B61BEF0D-F0BB-DE4B-95CE-6DB70DBA9567}" type="datetimeFigureOut">
               <a:rPr lang="en-US" dirty="0"/>
               <a:pPr/>
-              <a:t>8/3/22</a:t>
+              <a:t>8/4/22</a:t>
             </a:fld>
             <a:endParaRPr lang="en-US" dirty="0"/>
           </a:p>
@@ -11264,7 +11268,7 @@
             <a:fld id="{B61BEF0D-F0BB-DE4B-95CE-6DB70DBA9567}" type="datetimeFigureOut">
               <a:rPr lang="en-US" dirty="0"/>
               <a:pPr/>
-              <a:t>8/3/22</a:t>
+              <a:t>8/4/22</a:t>
             </a:fld>
             <a:endParaRPr lang="en-US" dirty="0"/>
           </a:p>
@@ -11423,7 +11427,7 @@
             <a:fld id="{B61BEF0D-F0BB-DE4B-95CE-6DB70DBA9567}" type="datetimeFigureOut">
               <a:rPr lang="en-US" dirty="0"/>
               <a:pPr/>
-              <a:t>8/3/22</a:t>
+              <a:t>8/4/22</a:t>
             </a:fld>
             <a:endParaRPr lang="en-US" dirty="0"/>
           </a:p>
@@ -11515,7 +11519,7 @@
             <a:fld id="{B61BEF0D-F0BB-DE4B-95CE-6DB70DBA9567}" type="datetimeFigureOut">
               <a:rPr lang="en-US" dirty="0"/>
               <a:pPr/>
-              <a:t>8/3/22</a:t>
+              <a:t>8/4/22</a:t>
             </a:fld>
             <a:endParaRPr lang="en-US" dirty="0"/>
           </a:p>
@@ -11890,7 +11894,7 @@
             <a:fld id="{B61BEF0D-F0BB-DE4B-95CE-6DB70DBA9567}" type="datetimeFigureOut">
               <a:rPr lang="en-US" dirty="0"/>
               <a:pPr/>
-              <a:t>8/3/22</a:t>
+              <a:t>8/4/22</a:t>
             </a:fld>
             <a:endParaRPr lang="en-US" dirty="0"/>
           </a:p>
@@ -12176,7 +12180,7 @@
             <a:fld id="{B61BEF0D-F0BB-DE4B-95CE-6DB70DBA9567}" type="datetimeFigureOut">
               <a:rPr lang="en-US" dirty="0"/>
               <a:pPr/>
-              <a:t>8/3/22</a:t>
+              <a:t>8/4/22</a:t>
             </a:fld>
             <a:endParaRPr lang="en-US" dirty="0"/>
           </a:p>
@@ -12384,7 +12388,7 @@
             <a:fld id="{B61BEF0D-F0BB-DE4B-95CE-6DB70DBA9567}" type="datetimeFigureOut">
               <a:rPr lang="en-US" dirty="0"/>
               <a:pPr/>
-              <a:t>8/3/22</a:t>
+              <a:t>8/4/22</a:t>
             </a:fld>
             <a:endParaRPr lang="en-US" dirty="0"/>
           </a:p>
@@ -13004,7 +13008,7 @@
           <a:p>
             <a:r>
               <a:rPr lang="en-US" dirty="0"/>
-              <a:t>TRANSACTIONS</a:t>
+              <a:t>transactions</a:t>
             </a:r>
           </a:p>
         </p:txBody>
@@ -13031,12 +13035,9 @@
           <a:lstStyle/>
           <a:p>
             <a:r>
-              <a:rPr lang="en-SG" dirty="0"/>
-              <a:t>Explain the requirements of a database transaction.</a:t>
+              <a:rPr lang="en-US" dirty="0"/>
+              <a:t> </a:t>
             </a:r>
-          </a:p>
-          <a:p>
-            <a:endParaRPr lang="en-US" dirty="0"/>
           </a:p>
         </p:txBody>
       </p:sp>
@@ -13044,241 +13045,6 @@
     <p:extLst>
       <p:ext uri="{BB962C8B-B14F-4D97-AF65-F5344CB8AC3E}">
         <p14:creationId xmlns:p14="http://schemas.microsoft.com/office/powerpoint/2010/main" val="2098735983"/>
-      </p:ext>
-    </p:extLst>
-  </p:cSld>
-  <p:clrMapOvr>
-    <a:masterClrMapping/>
-  </p:clrMapOvr>
-</p:sld>
-</file>
-
-<file path=ppt/slides/slide10.xml><?xml version="1.0" encoding="utf-8"?>
-<p:sld xmlns:a="http://schemas.openxmlformats.org/drawingml/2006/main" xmlns:r="http://schemas.openxmlformats.org/officeDocument/2006/relationships" xmlns:p="http://schemas.openxmlformats.org/presentationml/2006/main">
-  <p:cSld>
-    <p:spTree>
-      <p:nvGrpSpPr>
-        <p:cNvPr id="1" name=""/>
-        <p:cNvGrpSpPr/>
-        <p:nvPr/>
-      </p:nvGrpSpPr>
-      <p:grpSpPr>
-        <a:xfrm>
-          <a:off x="0" y="0"/>
-          <a:ext cx="0" cy="0"/>
-          <a:chOff x="0" y="0"/>
-          <a:chExt cx="0" cy="0"/>
-        </a:xfrm>
-      </p:grpSpPr>
-      <p:sp>
-        <p:nvSpPr>
-          <p:cNvPr id="2" name="Title 1">
-            <a:extLst>
-              <a:ext uri="{FF2B5EF4-FFF2-40B4-BE49-F238E27FC236}">
-                <a16:creationId xmlns:a16="http://schemas.microsoft.com/office/drawing/2014/main" id="{45250DD3-EDE4-DB02-81A5-7FF4EC5CFFEB}"/>
-              </a:ext>
-            </a:extLst>
-          </p:cNvPr>
-          <p:cNvSpPr>
-            <a:spLocks noGrp="1"/>
-          </p:cNvSpPr>
-          <p:nvPr>
-            <p:ph type="title"/>
-          </p:nvPr>
-        </p:nvSpPr>
-        <p:spPr/>
-        <p:txBody>
-          <a:bodyPr/>
-          <a:lstStyle/>
-          <a:p>
-            <a:r>
-              <a:rPr lang="en-US" dirty="0"/>
-              <a:t>WHY transactions are important</a:t>
-            </a:r>
-          </a:p>
-        </p:txBody>
-      </p:sp>
-      <p:pic>
-        <p:nvPicPr>
-          <p:cNvPr id="12" name="Picture 11">
-            <a:extLst>
-              <a:ext uri="{FF2B5EF4-FFF2-40B4-BE49-F238E27FC236}">
-                <a16:creationId xmlns:a16="http://schemas.microsoft.com/office/drawing/2014/main" id="{3A7C58C8-2A77-9A21-71AE-D096152D3A98}"/>
-              </a:ext>
-            </a:extLst>
-          </p:cNvPr>
-          <p:cNvPicPr>
-            <a:picLocks noChangeAspect="1"/>
-          </p:cNvPicPr>
-          <p:nvPr/>
-        </p:nvPicPr>
-        <p:blipFill>
-          <a:blip r:embed="rId2"/>
-          <a:stretch>
-            <a:fillRect/>
-          </a:stretch>
-        </p:blipFill>
-        <p:spPr>
-          <a:xfrm>
-            <a:off x="3101808" y="2399952"/>
-            <a:ext cx="7032752" cy="3230670"/>
-          </a:xfrm>
-          <a:prstGeom prst="rect">
-            <a:avLst/>
-          </a:prstGeom>
-        </p:spPr>
-      </p:pic>
-      <p:sp>
-        <p:nvSpPr>
-          <p:cNvPr id="13" name="Oval 12">
-            <a:extLst>
-              <a:ext uri="{FF2B5EF4-FFF2-40B4-BE49-F238E27FC236}">
-                <a16:creationId xmlns:a16="http://schemas.microsoft.com/office/drawing/2014/main" id="{6467A6F9-F20D-9F49-73BB-4860DCBE093D}"/>
-              </a:ext>
-            </a:extLst>
-          </p:cNvPr>
-          <p:cNvSpPr/>
-          <p:nvPr/>
-        </p:nvSpPr>
-        <p:spPr>
-          <a:xfrm>
-            <a:off x="2698808" y="2886510"/>
-            <a:ext cx="343096" cy="262066"/>
-          </a:xfrm>
-          <a:prstGeom prst="ellipse">
-            <a:avLst/>
-          </a:prstGeom>
-        </p:spPr>
-        <p:style>
-          <a:lnRef idx="2">
-            <a:schemeClr val="accent1">
-              <a:shade val="50000"/>
-            </a:schemeClr>
-          </a:lnRef>
-          <a:fillRef idx="1">
-            <a:schemeClr val="accent1"/>
-          </a:fillRef>
-          <a:effectRef idx="0">
-            <a:schemeClr val="accent1"/>
-          </a:effectRef>
-          <a:fontRef idx="minor">
-            <a:schemeClr val="lt1"/>
-          </a:fontRef>
-        </p:style>
-        <p:txBody>
-          <a:bodyPr rtlCol="0" anchor="ctr"/>
-          <a:lstStyle/>
-          <a:p>
-            <a:pPr algn="ctr"/>
-            <a:r>
-              <a:rPr lang="en-US" dirty="0"/>
-              <a:t>1</a:t>
-            </a:r>
-          </a:p>
-        </p:txBody>
-      </p:sp>
-      <p:sp>
-        <p:nvSpPr>
-          <p:cNvPr id="14" name="Oval 13">
-            <a:extLst>
-              <a:ext uri="{FF2B5EF4-FFF2-40B4-BE49-F238E27FC236}">
-                <a16:creationId xmlns:a16="http://schemas.microsoft.com/office/drawing/2014/main" id="{F55BE5FE-F5C6-C61A-9054-3B9474FCFCB6}"/>
-              </a:ext>
-            </a:extLst>
-          </p:cNvPr>
-          <p:cNvSpPr/>
-          <p:nvPr/>
-        </p:nvSpPr>
-        <p:spPr>
-          <a:xfrm>
-            <a:off x="2698808" y="3669793"/>
-            <a:ext cx="343096" cy="262066"/>
-          </a:xfrm>
-          <a:prstGeom prst="ellipse">
-            <a:avLst/>
-          </a:prstGeom>
-        </p:spPr>
-        <p:style>
-          <a:lnRef idx="2">
-            <a:schemeClr val="accent1">
-              <a:shade val="50000"/>
-            </a:schemeClr>
-          </a:lnRef>
-          <a:fillRef idx="1">
-            <a:schemeClr val="accent1"/>
-          </a:fillRef>
-          <a:effectRef idx="0">
-            <a:schemeClr val="accent1"/>
-          </a:effectRef>
-          <a:fontRef idx="minor">
-            <a:schemeClr val="lt1"/>
-          </a:fontRef>
-        </p:style>
-        <p:txBody>
-          <a:bodyPr rtlCol="0" anchor="ctr"/>
-          <a:lstStyle/>
-          <a:p>
-            <a:pPr algn="ctr"/>
-            <a:r>
-              <a:rPr lang="en-US" dirty="0"/>
-              <a:t>2</a:t>
-            </a:r>
-          </a:p>
-        </p:txBody>
-      </p:sp>
-      <p:sp>
-        <p:nvSpPr>
-          <p:cNvPr id="15" name="Oval 14">
-            <a:extLst>
-              <a:ext uri="{FF2B5EF4-FFF2-40B4-BE49-F238E27FC236}">
-                <a16:creationId xmlns:a16="http://schemas.microsoft.com/office/drawing/2014/main" id="{4DD9E24A-16A1-9E73-C4BB-2E9908FFDD09}"/>
-              </a:ext>
-            </a:extLst>
-          </p:cNvPr>
-          <p:cNvSpPr/>
-          <p:nvPr/>
-        </p:nvSpPr>
-        <p:spPr>
-          <a:xfrm>
-            <a:off x="2698808" y="4457112"/>
-            <a:ext cx="343096" cy="262066"/>
-          </a:xfrm>
-          <a:prstGeom prst="ellipse">
-            <a:avLst/>
-          </a:prstGeom>
-        </p:spPr>
-        <p:style>
-          <a:lnRef idx="2">
-            <a:schemeClr val="accent1">
-              <a:shade val="50000"/>
-            </a:schemeClr>
-          </a:lnRef>
-          <a:fillRef idx="1">
-            <a:schemeClr val="accent1"/>
-          </a:fillRef>
-          <a:effectRef idx="0">
-            <a:schemeClr val="accent1"/>
-          </a:effectRef>
-          <a:fontRef idx="minor">
-            <a:schemeClr val="lt1"/>
-          </a:fontRef>
-        </p:style>
-        <p:txBody>
-          <a:bodyPr rtlCol="0" anchor="ctr"/>
-          <a:lstStyle/>
-          <a:p>
-            <a:pPr algn="ctr"/>
-            <a:r>
-              <a:rPr lang="en-US" dirty="0"/>
-              <a:t>3</a:t>
-            </a:r>
-          </a:p>
-        </p:txBody>
-      </p:sp>
-    </p:spTree>
-    <p:extLst>
-      <p:ext uri="{BB962C8B-B14F-4D97-AF65-F5344CB8AC3E}">
-        <p14:creationId xmlns:p14="http://schemas.microsoft.com/office/powerpoint/2010/main" val="798311933"/>
       </p:ext>
     </p:extLst>
   </p:cSld>
@@ -13362,9 +13128,8 @@
           <a:p>
             <a:r>
               <a:rPr lang="en-SG" dirty="0"/>
-              <a:t>Hands-on writing statements to commit a database transaction</a:t>
+              <a:t>Understand what are transactions</a:t>
             </a:r>
-            <a:endParaRPr lang="en-US" dirty="0"/>
           </a:p>
         </p:txBody>
       </p:sp>
@@ -13421,7 +13186,7 @@
           <a:p>
             <a:r>
               <a:rPr lang="en-US" dirty="0"/>
-              <a:t>A general view on “transaction”</a:t>
+              <a:t>A layman’s perspective of transactions</a:t>
             </a:r>
           </a:p>
         </p:txBody>
@@ -14263,6 +14028,57 @@
           </a:p>
         </p:txBody>
       </p:sp>
+      <p:sp>
+        <p:nvSpPr>
+          <p:cNvPr id="6" name="TextBox 5">
+            <a:extLst>
+              <a:ext uri="{FF2B5EF4-FFF2-40B4-BE49-F238E27FC236}">
+                <a16:creationId xmlns:a16="http://schemas.microsoft.com/office/drawing/2014/main" id="{E1B145AA-ABA9-93DE-BEB4-66053BB7C008}"/>
+              </a:ext>
+            </a:extLst>
+          </p:cNvPr>
+          <p:cNvSpPr txBox="1"/>
+          <p:nvPr/>
+        </p:nvSpPr>
+        <p:spPr>
+          <a:xfrm>
+            <a:off x="1598487" y="5783609"/>
+            <a:ext cx="9529278" cy="646331"/>
+          </a:xfrm>
+          <a:prstGeom prst="rect">
+            <a:avLst/>
+          </a:prstGeom>
+          <a:noFill/>
+          <a:ln>
+            <a:solidFill>
+              <a:schemeClr val="tx1"/>
+            </a:solidFill>
+          </a:ln>
+        </p:spPr>
+        <p:txBody>
+          <a:bodyPr wrap="square">
+            <a:spAutoFit/>
+          </a:bodyPr>
+          <a:lstStyle/>
+          <a:p>
+            <a:pPr marL="0" indent="0">
+              <a:buNone/>
+            </a:pPr>
+            <a:r>
+              <a:rPr lang="en-SG" dirty="0"/>
+              <a:t>A Unit of transaction shown here is inclusive of (A + B)</a:t>
+            </a:r>
+            <a:br>
+              <a:rPr lang="en-SG" dirty="0"/>
+            </a:br>
+            <a:r>
+              <a:rPr lang="en-SG" dirty="0"/>
+              <a:t>Both A and B must be successfully executed, otherwise the entire Unit of transaction shall fail</a:t>
+            </a:r>
+            <a:endParaRPr lang="en-US" dirty="0"/>
+          </a:p>
+        </p:txBody>
+      </p:sp>
     </p:spTree>
     <p:extLst>
       <p:ext uri="{BB962C8B-B14F-4D97-AF65-F5344CB8AC3E}">
@@ -14316,670 +14132,7 @@
           <a:p>
             <a:r>
               <a:rPr lang="en-US" dirty="0"/>
-              <a:t>a general view on “transaction”</a:t>
-            </a:r>
-          </a:p>
-        </p:txBody>
-      </p:sp>
-      <p:pic>
-        <p:nvPicPr>
-          <p:cNvPr id="5" name="Content Placeholder 4" descr="User with solid fill">
-            <a:extLst>
-              <a:ext uri="{FF2B5EF4-FFF2-40B4-BE49-F238E27FC236}">
-                <a16:creationId xmlns:a16="http://schemas.microsoft.com/office/drawing/2014/main" id="{39E0D192-33B8-1DD2-16EE-861FB062633B}"/>
-              </a:ext>
-            </a:extLst>
-          </p:cNvPr>
-          <p:cNvPicPr>
-            <a:picLocks noGrp="1" noChangeAspect="1"/>
-          </p:cNvPicPr>
-          <p:nvPr>
-            <p:ph idx="1"/>
-          </p:nvPr>
-        </p:nvPicPr>
-        <p:blipFill>
-          <a:blip r:embed="rId2">
-            <a:extLst>
-              <a:ext uri="{96DAC541-7B7A-43D3-8B79-37D633B846F1}">
-                <asvg:svgBlip xmlns:asvg="http://schemas.microsoft.com/office/drawing/2016/SVG/main" r:embed="rId3"/>
-              </a:ext>
-            </a:extLst>
-          </a:blip>
-          <a:stretch>
-            <a:fillRect/>
-          </a:stretch>
-        </p:blipFill>
-        <p:spPr>
-          <a:xfrm>
-            <a:off x="4971105" y="2621477"/>
-            <a:ext cx="1615045" cy="1615045"/>
-          </a:xfrm>
-        </p:spPr>
-      </p:pic>
-      <p:pic>
-        <p:nvPicPr>
-          <p:cNvPr id="7" name="Graphic 6" descr="Modern architecture with solid fill">
-            <a:extLst>
-              <a:ext uri="{FF2B5EF4-FFF2-40B4-BE49-F238E27FC236}">
-                <a16:creationId xmlns:a16="http://schemas.microsoft.com/office/drawing/2014/main" id="{A678EDB5-329E-4B5F-937B-60B0533975C3}"/>
-              </a:ext>
-            </a:extLst>
-          </p:cNvPr>
-          <p:cNvPicPr>
-            <a:picLocks noChangeAspect="1"/>
-          </p:cNvPicPr>
-          <p:nvPr/>
-        </p:nvPicPr>
-        <p:blipFill>
-          <a:blip r:embed="rId4">
-            <a:extLst>
-              <a:ext uri="{96DAC541-7B7A-43D3-8B79-37D633B846F1}">
-                <asvg:svgBlip xmlns:asvg="http://schemas.microsoft.com/office/drawing/2016/SVG/main" r:embed="rId5"/>
-              </a:ext>
-            </a:extLst>
-          </a:blip>
-          <a:stretch>
-            <a:fillRect/>
-          </a:stretch>
-        </p:blipFill>
-        <p:spPr>
-          <a:xfrm>
-            <a:off x="941819" y="2276412"/>
-            <a:ext cx="2058110" cy="2058110"/>
-          </a:xfrm>
-          <a:prstGeom prst="rect">
-            <a:avLst/>
-          </a:prstGeom>
-        </p:spPr>
-      </p:pic>
-      <p:pic>
-        <p:nvPicPr>
-          <p:cNvPr id="9" name="Graphic 8" descr="Bank with solid fill">
-            <a:extLst>
-              <a:ext uri="{FF2B5EF4-FFF2-40B4-BE49-F238E27FC236}">
-                <a16:creationId xmlns:a16="http://schemas.microsoft.com/office/drawing/2014/main" id="{8C5BFCFB-E955-C43F-F3C5-BE55D7FE4FC1}"/>
-              </a:ext>
-            </a:extLst>
-          </p:cNvPr>
-          <p:cNvPicPr>
-            <a:picLocks noChangeAspect="1"/>
-          </p:cNvPicPr>
-          <p:nvPr/>
-        </p:nvPicPr>
-        <p:blipFill>
-          <a:blip r:embed="rId6">
-            <a:extLst>
-              <a:ext uri="{96DAC541-7B7A-43D3-8B79-37D633B846F1}">
-                <asvg:svgBlip xmlns:asvg="http://schemas.microsoft.com/office/drawing/2016/SVG/main" r:embed="rId7"/>
-              </a:ext>
-            </a:extLst>
-          </a:blip>
-          <a:stretch>
-            <a:fillRect/>
-          </a:stretch>
-        </p:blipFill>
-        <p:spPr>
-          <a:xfrm>
-            <a:off x="8557326" y="2178412"/>
-            <a:ext cx="2058110" cy="2058110"/>
-          </a:xfrm>
-          <a:prstGeom prst="rect">
-            <a:avLst/>
-          </a:prstGeom>
-        </p:spPr>
-      </p:pic>
-      <p:sp>
-        <p:nvSpPr>
-          <p:cNvPr id="10" name="TextBox 9">
-            <a:extLst>
-              <a:ext uri="{FF2B5EF4-FFF2-40B4-BE49-F238E27FC236}">
-                <a16:creationId xmlns:a16="http://schemas.microsoft.com/office/drawing/2014/main" id="{D4BF5CAA-FFEA-CE85-82E2-3EF5AAD4852D}"/>
-              </a:ext>
-            </a:extLst>
-          </p:cNvPr>
-          <p:cNvSpPr txBox="1"/>
-          <p:nvPr/>
-        </p:nvSpPr>
-        <p:spPr>
-          <a:xfrm>
-            <a:off x="3227050" y="2607302"/>
-            <a:ext cx="1865376" cy="646331"/>
-          </a:xfrm>
-          <a:prstGeom prst="rect">
-            <a:avLst/>
-          </a:prstGeom>
-          <a:noFill/>
-        </p:spPr>
-        <p:txBody>
-          <a:bodyPr wrap="square" rtlCol="0">
-            <a:spAutoFit/>
-          </a:bodyPr>
-          <a:lstStyle/>
-          <a:p>
-            <a:r>
-              <a:rPr lang="en-US" dirty="0"/>
-              <a:t>Customer pays $200 to factory</a:t>
-            </a:r>
-          </a:p>
-        </p:txBody>
-      </p:sp>
-      <p:cxnSp>
-        <p:nvCxnSpPr>
-          <p:cNvPr id="12" name="Straight Arrow Connector 11">
-            <a:extLst>
-              <a:ext uri="{FF2B5EF4-FFF2-40B4-BE49-F238E27FC236}">
-                <a16:creationId xmlns:a16="http://schemas.microsoft.com/office/drawing/2014/main" id="{DB096F46-CD64-0D06-6294-9F598C435BD1}"/>
-              </a:ext>
-            </a:extLst>
-          </p:cNvPr>
-          <p:cNvCxnSpPr>
-            <a:cxnSpLocks/>
-            <a:stCxn id="5" idx="1"/>
-          </p:cNvCxnSpPr>
-          <p:nvPr/>
-        </p:nvCxnSpPr>
-        <p:spPr>
-          <a:xfrm flipH="1">
-            <a:off x="2840736" y="3429000"/>
-            <a:ext cx="2130369" cy="0"/>
-          </a:xfrm>
-          <a:prstGeom prst="straightConnector1">
-            <a:avLst/>
-          </a:prstGeom>
-          <a:ln>
-            <a:tailEnd type="triangle"/>
-          </a:ln>
-        </p:spPr>
-        <p:style>
-          <a:lnRef idx="1">
-            <a:schemeClr val="accent1"/>
-          </a:lnRef>
-          <a:fillRef idx="0">
-            <a:schemeClr val="accent1"/>
-          </a:fillRef>
-          <a:effectRef idx="0">
-            <a:schemeClr val="accent1"/>
-          </a:effectRef>
-          <a:fontRef idx="minor">
-            <a:schemeClr val="tx1"/>
-          </a:fontRef>
-        </p:style>
-      </p:cxnSp>
-      <p:sp>
-        <p:nvSpPr>
-          <p:cNvPr id="15" name="TextBox 14">
-            <a:extLst>
-              <a:ext uri="{FF2B5EF4-FFF2-40B4-BE49-F238E27FC236}">
-                <a16:creationId xmlns:a16="http://schemas.microsoft.com/office/drawing/2014/main" id="{219E48CE-2DB1-B792-FD71-4481601BE74B}"/>
-              </a:ext>
-            </a:extLst>
-          </p:cNvPr>
-          <p:cNvSpPr txBox="1"/>
-          <p:nvPr/>
-        </p:nvSpPr>
-        <p:spPr>
-          <a:xfrm>
-            <a:off x="7016496" y="2468803"/>
-            <a:ext cx="1865376" cy="923330"/>
-          </a:xfrm>
-          <a:prstGeom prst="rect">
-            <a:avLst/>
-          </a:prstGeom>
-          <a:noFill/>
-        </p:spPr>
-        <p:txBody>
-          <a:bodyPr wrap="square" rtlCol="0">
-            <a:spAutoFit/>
-          </a:bodyPr>
-          <a:lstStyle/>
-          <a:p>
-            <a:r>
-              <a:rPr lang="en-US" dirty="0"/>
-              <a:t>Deducts $200 from customer account</a:t>
-            </a:r>
-          </a:p>
-        </p:txBody>
-      </p:sp>
-      <p:cxnSp>
-        <p:nvCxnSpPr>
-          <p:cNvPr id="17" name="Straight Arrow Connector 16">
-            <a:extLst>
-              <a:ext uri="{FF2B5EF4-FFF2-40B4-BE49-F238E27FC236}">
-                <a16:creationId xmlns:a16="http://schemas.microsoft.com/office/drawing/2014/main" id="{D59DC7B7-4665-F451-F670-6DF94FD3B94F}"/>
-              </a:ext>
-            </a:extLst>
-          </p:cNvPr>
-          <p:cNvCxnSpPr>
-            <a:cxnSpLocks/>
-            <a:endCxn id="5" idx="3"/>
-          </p:cNvCxnSpPr>
-          <p:nvPr/>
-        </p:nvCxnSpPr>
-        <p:spPr>
-          <a:xfrm flipH="1">
-            <a:off x="6586150" y="3429000"/>
-            <a:ext cx="2417642" cy="0"/>
-          </a:xfrm>
-          <a:prstGeom prst="straightConnector1">
-            <a:avLst/>
-          </a:prstGeom>
-          <a:ln>
-            <a:tailEnd type="triangle"/>
-          </a:ln>
-        </p:spPr>
-        <p:style>
-          <a:lnRef idx="1">
-            <a:schemeClr val="accent1"/>
-          </a:lnRef>
-          <a:fillRef idx="0">
-            <a:schemeClr val="accent1"/>
-          </a:fillRef>
-          <a:effectRef idx="0">
-            <a:schemeClr val="accent1"/>
-          </a:effectRef>
-          <a:fontRef idx="minor">
-            <a:schemeClr val="tx1"/>
-          </a:fontRef>
-        </p:style>
-      </p:cxnSp>
-      <p:sp>
-        <p:nvSpPr>
-          <p:cNvPr id="23" name="Oval 22">
-            <a:extLst>
-              <a:ext uri="{FF2B5EF4-FFF2-40B4-BE49-F238E27FC236}">
-                <a16:creationId xmlns:a16="http://schemas.microsoft.com/office/drawing/2014/main" id="{C0DF3A40-2788-B6DE-93ED-F84E5DAE6C51}"/>
-              </a:ext>
-            </a:extLst>
-          </p:cNvPr>
-          <p:cNvSpPr/>
-          <p:nvPr/>
-        </p:nvSpPr>
-        <p:spPr>
-          <a:xfrm>
-            <a:off x="7673610" y="3579777"/>
-            <a:ext cx="453370" cy="505968"/>
-          </a:xfrm>
-          <a:prstGeom prst="ellipse">
-            <a:avLst/>
-          </a:prstGeom>
-        </p:spPr>
-        <p:style>
-          <a:lnRef idx="2">
-            <a:schemeClr val="accent1">
-              <a:shade val="50000"/>
-            </a:schemeClr>
-          </a:lnRef>
-          <a:fillRef idx="1">
-            <a:schemeClr val="accent1"/>
-          </a:fillRef>
-          <a:effectRef idx="0">
-            <a:schemeClr val="accent1"/>
-          </a:effectRef>
-          <a:fontRef idx="minor">
-            <a:schemeClr val="lt1"/>
-          </a:fontRef>
-        </p:style>
-        <p:txBody>
-          <a:bodyPr rtlCol="0" anchor="ctr"/>
-          <a:lstStyle/>
-          <a:p>
-            <a:pPr algn="ctr"/>
-            <a:r>
-              <a:rPr lang="en-US" dirty="0"/>
-              <a:t>A</a:t>
-            </a:r>
-          </a:p>
-        </p:txBody>
-      </p:sp>
-      <p:sp>
-        <p:nvSpPr>
-          <p:cNvPr id="25" name="Oval 24">
-            <a:extLst>
-              <a:ext uri="{FF2B5EF4-FFF2-40B4-BE49-F238E27FC236}">
-                <a16:creationId xmlns:a16="http://schemas.microsoft.com/office/drawing/2014/main" id="{F34751D8-0747-2A0E-2339-7E7B89EC4B77}"/>
-              </a:ext>
-            </a:extLst>
-          </p:cNvPr>
-          <p:cNvSpPr/>
-          <p:nvPr/>
-        </p:nvSpPr>
-        <p:spPr>
-          <a:xfrm>
-            <a:off x="3747320" y="3579777"/>
-            <a:ext cx="453370" cy="505968"/>
-          </a:xfrm>
-          <a:prstGeom prst="ellipse">
-            <a:avLst/>
-          </a:prstGeom>
-        </p:spPr>
-        <p:style>
-          <a:lnRef idx="2">
-            <a:schemeClr val="accent1">
-              <a:shade val="50000"/>
-            </a:schemeClr>
-          </a:lnRef>
-          <a:fillRef idx="1">
-            <a:schemeClr val="accent1"/>
-          </a:fillRef>
-          <a:effectRef idx="0">
-            <a:schemeClr val="accent1"/>
-          </a:effectRef>
-          <a:fontRef idx="minor">
-            <a:schemeClr val="lt1"/>
-          </a:fontRef>
-        </p:style>
-        <p:txBody>
-          <a:bodyPr rtlCol="0" anchor="ctr"/>
-          <a:lstStyle/>
-          <a:p>
-            <a:pPr algn="ctr"/>
-            <a:r>
-              <a:rPr lang="en-US" dirty="0"/>
-              <a:t>B</a:t>
-            </a:r>
-          </a:p>
-        </p:txBody>
-      </p:sp>
-      <p:sp>
-        <p:nvSpPr>
-          <p:cNvPr id="26" name="Content Placeholder 2">
-            <a:extLst>
-              <a:ext uri="{FF2B5EF4-FFF2-40B4-BE49-F238E27FC236}">
-                <a16:creationId xmlns:a16="http://schemas.microsoft.com/office/drawing/2014/main" id="{01A0B8E6-DD69-63FD-2400-E28E404C945C}"/>
-              </a:ext>
-            </a:extLst>
-          </p:cNvPr>
-          <p:cNvSpPr txBox="1">
-            <a:spLocks/>
-          </p:cNvSpPr>
-          <p:nvPr/>
-        </p:nvSpPr>
-        <p:spPr>
-          <a:xfrm>
-            <a:off x="581192" y="4526913"/>
-            <a:ext cx="11029615" cy="1331886"/>
-          </a:xfrm>
-          <a:prstGeom prst="rect">
-            <a:avLst/>
-          </a:prstGeom>
-        </p:spPr>
-        <p:txBody>
-          <a:bodyPr vert="horz" lIns="91440" tIns="45720" rIns="91440" bIns="45720" rtlCol="0" anchor="ctr">
-            <a:normAutofit/>
-          </a:bodyPr>
-          <a:lstStyle>
-            <a:lvl1pPr marL="306000" indent="-306000" algn="l" defTabSz="457200" rtl="0" eaLnBrk="1" latinLnBrk="0" hangingPunct="1">
-              <a:spcBef>
-                <a:spcPct val="20000"/>
-              </a:spcBef>
-              <a:spcAft>
-                <a:spcPts val="600"/>
-              </a:spcAft>
-              <a:buClr>
-                <a:schemeClr val="accent2"/>
-              </a:buClr>
-              <a:buSzPct val="92000"/>
-              <a:buFont typeface="Wingdings 2" panose="05020102010507070707" pitchFamily="18" charset="2"/>
-              <a:buChar char=""/>
-              <a:defRPr sz="1800" kern="1200">
-                <a:solidFill>
-                  <a:schemeClr val="tx2"/>
-                </a:solidFill>
-                <a:latin typeface="+mn-lt"/>
-                <a:ea typeface="+mn-ea"/>
-                <a:cs typeface="+mn-cs"/>
-              </a:defRPr>
-            </a:lvl1pPr>
-            <a:lvl2pPr marL="630000" indent="-306000" algn="l" defTabSz="457200" rtl="0" eaLnBrk="1" latinLnBrk="0" hangingPunct="1">
-              <a:spcBef>
-                <a:spcPct val="20000"/>
-              </a:spcBef>
-              <a:spcAft>
-                <a:spcPts val="600"/>
-              </a:spcAft>
-              <a:buClr>
-                <a:schemeClr val="accent2"/>
-              </a:buClr>
-              <a:buSzPct val="92000"/>
-              <a:buFont typeface="Wingdings 2" panose="05020102010507070707" pitchFamily="18" charset="2"/>
-              <a:buChar char=""/>
-              <a:defRPr sz="1600" kern="1200">
-                <a:solidFill>
-                  <a:schemeClr val="tx2"/>
-                </a:solidFill>
-                <a:latin typeface="+mn-lt"/>
-                <a:ea typeface="+mn-ea"/>
-                <a:cs typeface="+mn-cs"/>
-              </a:defRPr>
-            </a:lvl2pPr>
-            <a:lvl3pPr marL="900000" indent="-270000" algn="l" defTabSz="457200" rtl="0" eaLnBrk="1" latinLnBrk="0" hangingPunct="1">
-              <a:spcBef>
-                <a:spcPct val="20000"/>
-              </a:spcBef>
-              <a:spcAft>
-                <a:spcPts val="600"/>
-              </a:spcAft>
-              <a:buClr>
-                <a:schemeClr val="accent2"/>
-              </a:buClr>
-              <a:buSzPct val="92000"/>
-              <a:buFont typeface="Wingdings 2" panose="05020102010507070707" pitchFamily="18" charset="2"/>
-              <a:buChar char=""/>
-              <a:defRPr sz="1400" kern="1200">
-                <a:solidFill>
-                  <a:schemeClr val="tx2"/>
-                </a:solidFill>
-                <a:latin typeface="+mn-lt"/>
-                <a:ea typeface="+mn-ea"/>
-                <a:cs typeface="+mn-cs"/>
-              </a:defRPr>
-            </a:lvl3pPr>
-            <a:lvl4pPr marL="1242000" indent="-234000" algn="l" defTabSz="457200" rtl="0" eaLnBrk="1" latinLnBrk="0" hangingPunct="1">
-              <a:spcBef>
-                <a:spcPct val="20000"/>
-              </a:spcBef>
-              <a:spcAft>
-                <a:spcPts val="600"/>
-              </a:spcAft>
-              <a:buClr>
-                <a:schemeClr val="accent2"/>
-              </a:buClr>
-              <a:buSzPct val="92000"/>
-              <a:buFont typeface="Wingdings 2" panose="05020102010507070707" pitchFamily="18" charset="2"/>
-              <a:buChar char=""/>
-              <a:defRPr sz="1200" kern="1200">
-                <a:solidFill>
-                  <a:schemeClr val="tx2"/>
-                </a:solidFill>
-                <a:latin typeface="+mn-lt"/>
-                <a:ea typeface="+mn-ea"/>
-                <a:cs typeface="+mn-cs"/>
-              </a:defRPr>
-            </a:lvl4pPr>
-            <a:lvl5pPr marL="1602000" indent="-234000" algn="l" defTabSz="457200" rtl="0" eaLnBrk="1" latinLnBrk="0" hangingPunct="1">
-              <a:spcBef>
-                <a:spcPct val="20000"/>
-              </a:spcBef>
-              <a:spcAft>
-                <a:spcPts val="600"/>
-              </a:spcAft>
-              <a:buClr>
-                <a:schemeClr val="accent2"/>
-              </a:buClr>
-              <a:buSzPct val="92000"/>
-              <a:buFont typeface="Wingdings 2" panose="05020102010507070707" pitchFamily="18" charset="2"/>
-              <a:buChar char=""/>
-              <a:defRPr sz="1200" kern="1200">
-                <a:solidFill>
-                  <a:schemeClr val="tx2"/>
-                </a:solidFill>
-                <a:latin typeface="+mn-lt"/>
-                <a:ea typeface="+mn-ea"/>
-                <a:cs typeface="+mn-cs"/>
-              </a:defRPr>
-            </a:lvl5pPr>
-            <a:lvl6pPr marL="1900000" indent="-228600" algn="l" defTabSz="457200" rtl="0" eaLnBrk="1" latinLnBrk="0" hangingPunct="1">
-              <a:spcBef>
-                <a:spcPct val="20000"/>
-              </a:spcBef>
-              <a:spcAft>
-                <a:spcPts val="600"/>
-              </a:spcAft>
-              <a:buClr>
-                <a:schemeClr val="accent2"/>
-              </a:buClr>
-              <a:buSzPct val="92000"/>
-              <a:buFont typeface="Wingdings 2" panose="05020102010507070707" pitchFamily="18" charset="2"/>
-              <a:buChar char=""/>
-              <a:defRPr sz="1200" kern="1200">
-                <a:solidFill>
-                  <a:schemeClr val="tx2"/>
-                </a:solidFill>
-                <a:latin typeface="+mn-lt"/>
-                <a:ea typeface="+mn-ea"/>
-                <a:cs typeface="+mn-cs"/>
-              </a:defRPr>
-            </a:lvl6pPr>
-            <a:lvl7pPr marL="2200000" indent="-228600" algn="l" defTabSz="457200" rtl="0" eaLnBrk="1" latinLnBrk="0" hangingPunct="1">
-              <a:spcBef>
-                <a:spcPct val="20000"/>
-              </a:spcBef>
-              <a:spcAft>
-                <a:spcPts val="600"/>
-              </a:spcAft>
-              <a:buClr>
-                <a:schemeClr val="accent2"/>
-              </a:buClr>
-              <a:buSzPct val="92000"/>
-              <a:buFont typeface="Wingdings 2" panose="05020102010507070707" pitchFamily="18" charset="2"/>
-              <a:buChar char=""/>
-              <a:defRPr sz="1200" kern="1200">
-                <a:solidFill>
-                  <a:schemeClr val="tx2"/>
-                </a:solidFill>
-                <a:latin typeface="+mn-lt"/>
-                <a:ea typeface="+mn-ea"/>
-                <a:cs typeface="+mn-cs"/>
-              </a:defRPr>
-            </a:lvl7pPr>
-            <a:lvl8pPr marL="2500000" indent="-228600" algn="l" defTabSz="457200" rtl="0" eaLnBrk="1" latinLnBrk="0" hangingPunct="1">
-              <a:spcBef>
-                <a:spcPct val="20000"/>
-              </a:spcBef>
-              <a:spcAft>
-                <a:spcPts val="600"/>
-              </a:spcAft>
-              <a:buClr>
-                <a:schemeClr val="accent2"/>
-              </a:buClr>
-              <a:buSzPct val="92000"/>
-              <a:buFont typeface="Wingdings 2" panose="05020102010507070707" pitchFamily="18" charset="2"/>
-              <a:buChar char=""/>
-              <a:defRPr sz="1200" kern="1200">
-                <a:solidFill>
-                  <a:schemeClr val="tx2"/>
-                </a:solidFill>
-                <a:latin typeface="+mn-lt"/>
-                <a:ea typeface="+mn-ea"/>
-                <a:cs typeface="+mn-cs"/>
-              </a:defRPr>
-            </a:lvl8pPr>
-            <a:lvl9pPr marL="2800000" indent="-228600" algn="l" defTabSz="457200" rtl="0" eaLnBrk="1" latinLnBrk="0" hangingPunct="1">
-              <a:spcBef>
-                <a:spcPct val="20000"/>
-              </a:spcBef>
-              <a:spcAft>
-                <a:spcPts val="600"/>
-              </a:spcAft>
-              <a:buClr>
-                <a:schemeClr val="accent2"/>
-              </a:buClr>
-              <a:buSzPct val="92000"/>
-              <a:buFont typeface="Wingdings 2" panose="05020102010507070707" pitchFamily="18" charset="2"/>
-              <a:buChar char=""/>
-              <a:defRPr sz="1200" kern="1200">
-                <a:solidFill>
-                  <a:schemeClr val="tx2"/>
-                </a:solidFill>
-                <a:latin typeface="+mn-lt"/>
-                <a:ea typeface="+mn-ea"/>
-                <a:cs typeface="+mn-cs"/>
-              </a:defRPr>
-            </a:lvl9pPr>
-          </a:lstStyle>
-          <a:p>
-            <a:pPr marL="0" indent="0">
-              <a:buNone/>
-            </a:pPr>
-            <a:r>
-              <a:rPr lang="en-SG" dirty="0"/>
-              <a:t>A Unit of transaction shown here is inclusive of (A + B)</a:t>
-            </a:r>
-            <a:br>
-              <a:rPr lang="en-SG" dirty="0"/>
-            </a:br>
-            <a:r>
-              <a:rPr lang="en-SG" dirty="0"/>
-              <a:t>Both A and B must be successfully executed, otherwise the entire Unit of transaction shall fail</a:t>
-            </a:r>
-            <a:endParaRPr lang="en-US" dirty="0"/>
-          </a:p>
-        </p:txBody>
-      </p:sp>
-    </p:spTree>
-    <p:extLst>
-      <p:ext uri="{BB962C8B-B14F-4D97-AF65-F5344CB8AC3E}">
-        <p14:creationId xmlns:p14="http://schemas.microsoft.com/office/powerpoint/2010/main" val="1918902329"/>
-      </p:ext>
-    </p:extLst>
-  </p:cSld>
-  <p:clrMapOvr>
-    <a:masterClrMapping/>
-  </p:clrMapOvr>
-</p:sld>
-</file>
-
-<file path=ppt/slides/slide5.xml><?xml version="1.0" encoding="utf-8"?>
-<p:sld xmlns:a="http://schemas.openxmlformats.org/drawingml/2006/main" xmlns:r="http://schemas.openxmlformats.org/officeDocument/2006/relationships" xmlns:p="http://schemas.openxmlformats.org/presentationml/2006/main">
-  <p:cSld>
-    <p:spTree>
-      <p:nvGrpSpPr>
-        <p:cNvPr id="1" name=""/>
-        <p:cNvGrpSpPr/>
-        <p:nvPr/>
-      </p:nvGrpSpPr>
-      <p:grpSpPr>
-        <a:xfrm>
-          <a:off x="0" y="0"/>
-          <a:ext cx="0" cy="0"/>
-          <a:chOff x="0" y="0"/>
-          <a:chExt cx="0" cy="0"/>
-        </a:xfrm>
-      </p:grpSpPr>
-      <p:sp>
-        <p:nvSpPr>
-          <p:cNvPr id="2" name="Title 1">
-            <a:extLst>
-              <a:ext uri="{FF2B5EF4-FFF2-40B4-BE49-F238E27FC236}">
-                <a16:creationId xmlns:a16="http://schemas.microsoft.com/office/drawing/2014/main" id="{45250DD3-EDE4-DB02-81A5-7FF4EC5CFFEB}"/>
-              </a:ext>
-            </a:extLst>
-          </p:cNvPr>
-          <p:cNvSpPr>
-            <a:spLocks noGrp="1"/>
-          </p:cNvSpPr>
-          <p:nvPr>
-            <p:ph type="title"/>
-          </p:nvPr>
-        </p:nvSpPr>
-        <p:spPr/>
-        <p:txBody>
-          <a:bodyPr/>
-          <a:lstStyle/>
-          <a:p>
-            <a:r>
-              <a:rPr lang="en-US" dirty="0"/>
-              <a:t>WHY transactions are important</a:t>
+              <a:t>A sequential transaction flow</a:t>
             </a:r>
           </a:p>
         </p:txBody>
@@ -15347,7 +14500,7 @@
 </p:sld>
 </file>
 
-<file path=ppt/slides/slide6.xml><?xml version="1.0" encoding="utf-8"?>
+<file path=ppt/slides/slide5.xml><?xml version="1.0" encoding="utf-8"?>
 <p:sld xmlns:a="http://schemas.openxmlformats.org/drawingml/2006/main" xmlns:r="http://schemas.openxmlformats.org/officeDocument/2006/relationships" xmlns:p="http://schemas.openxmlformats.org/presentationml/2006/main">
   <p:cSld>
     <p:spTree>
@@ -15387,7 +14540,7 @@
           <a:p>
             <a:r>
               <a:rPr lang="en-US" dirty="0"/>
-              <a:t>WHY transactions are important</a:t>
+              <a:t>Process of transactions</a:t>
             </a:r>
           </a:p>
         </p:txBody>
@@ -15677,7 +14830,7 @@
 </p:sld>
 </file>
 
-<file path=ppt/slides/slide7.xml><?xml version="1.0" encoding="utf-8"?>
+<file path=ppt/slides/slide6.xml><?xml version="1.0" encoding="utf-8"?>
 <p:sld xmlns:a="http://schemas.openxmlformats.org/drawingml/2006/main" xmlns:r="http://schemas.openxmlformats.org/officeDocument/2006/relationships" xmlns:p="http://schemas.openxmlformats.org/presentationml/2006/main">
   <p:cSld>
     <p:spTree>
@@ -15717,7 +14870,7 @@
           <a:p>
             <a:r>
               <a:rPr lang="en-US" dirty="0"/>
-              <a:t>WHY transactions are important</a:t>
+              <a:t>Requirements of transactions</a:t>
             </a:r>
           </a:p>
         </p:txBody>
@@ -15766,7 +14919,7 @@
 </p:sld>
 </file>
 
-<file path=ppt/slides/slide8.xml><?xml version="1.0" encoding="utf-8"?>
+<file path=ppt/slides/slide7.xml><?xml version="1.0" encoding="utf-8"?>
 <p:sld xmlns:a="http://schemas.openxmlformats.org/drawingml/2006/main" xmlns:r="http://schemas.openxmlformats.org/officeDocument/2006/relationships" xmlns:p="http://schemas.openxmlformats.org/presentationml/2006/main">
   <p:cSld>
     <p:spTree>
@@ -15806,7 +14959,7 @@
           <a:p>
             <a:r>
               <a:rPr lang="en-US" dirty="0"/>
-              <a:t>WHY transactions are important</a:t>
+              <a:t>How can transactions be optimized</a:t>
             </a:r>
           </a:p>
         </p:txBody>
@@ -15986,6 +15139,90 @@
 </p:sld>
 </file>
 
+<file path=ppt/slides/slide8.xml><?xml version="1.0" encoding="utf-8"?>
+<p:sld xmlns:a="http://schemas.openxmlformats.org/drawingml/2006/main" xmlns:r="http://schemas.openxmlformats.org/officeDocument/2006/relationships" xmlns:p="http://schemas.openxmlformats.org/presentationml/2006/main">
+  <p:cSld>
+    <p:spTree>
+      <p:nvGrpSpPr>
+        <p:cNvPr id="1" name=""/>
+        <p:cNvGrpSpPr/>
+        <p:nvPr/>
+      </p:nvGrpSpPr>
+      <p:grpSpPr>
+        <a:xfrm>
+          <a:off x="0" y="0"/>
+          <a:ext cx="0" cy="0"/>
+          <a:chOff x="0" y="0"/>
+          <a:chExt cx="0" cy="0"/>
+        </a:xfrm>
+      </p:grpSpPr>
+      <p:sp>
+        <p:nvSpPr>
+          <p:cNvPr id="2" name="Title 1">
+            <a:extLst>
+              <a:ext uri="{FF2B5EF4-FFF2-40B4-BE49-F238E27FC236}">
+                <a16:creationId xmlns:a16="http://schemas.microsoft.com/office/drawing/2014/main" id="{45250DD3-EDE4-DB02-81A5-7FF4EC5CFFEB}"/>
+              </a:ext>
+            </a:extLst>
+          </p:cNvPr>
+          <p:cNvSpPr>
+            <a:spLocks noGrp="1"/>
+          </p:cNvSpPr>
+          <p:nvPr>
+            <p:ph type="title"/>
+          </p:nvPr>
+        </p:nvSpPr>
+        <p:spPr/>
+        <p:txBody>
+          <a:bodyPr/>
+          <a:lstStyle/>
+          <a:p>
+            <a:r>
+              <a:rPr lang="en-US" dirty="0"/>
+              <a:t>Example of optimized transaction</a:t>
+            </a:r>
+          </a:p>
+        </p:txBody>
+      </p:sp>
+      <p:graphicFrame>
+        <p:nvGraphicFramePr>
+          <p:cNvPr id="5" name="Content Placeholder 4">
+            <a:extLst>
+              <a:ext uri="{FF2B5EF4-FFF2-40B4-BE49-F238E27FC236}">
+                <a16:creationId xmlns:a16="http://schemas.microsoft.com/office/drawing/2014/main" id="{06CE8F21-4CC9-EDB1-7F51-1F301CE1990D}"/>
+              </a:ext>
+            </a:extLst>
+          </p:cNvPr>
+          <p:cNvGraphicFramePr>
+            <a:graphicFrameLocks noGrp="1"/>
+          </p:cNvGraphicFramePr>
+          <p:nvPr>
+            <p:ph idx="1"/>
+          </p:nvPr>
+        </p:nvGraphicFramePr>
+        <p:xfrm>
+          <a:off x="581025" y="2181225"/>
+          <a:ext cx="11029950" cy="3678238"/>
+        </p:xfrm>
+        <a:graphic>
+          <a:graphicData uri="http://schemas.openxmlformats.org/drawingml/2006/diagram">
+            <dgm:relIds xmlns:dgm="http://schemas.openxmlformats.org/drawingml/2006/diagram" xmlns:r="http://schemas.openxmlformats.org/officeDocument/2006/relationships" r:dm="rId2" r:lo="rId3" r:qs="rId4" r:cs="rId5"/>
+          </a:graphicData>
+        </a:graphic>
+      </p:graphicFrame>
+    </p:spTree>
+    <p:extLst>
+      <p:ext uri="{BB962C8B-B14F-4D97-AF65-F5344CB8AC3E}">
+        <p14:creationId xmlns:p14="http://schemas.microsoft.com/office/powerpoint/2010/main" val="1655837689"/>
+      </p:ext>
+    </p:extLst>
+  </p:cSld>
+  <p:clrMapOvr>
+    <a:masterClrMapping/>
+  </p:clrMapOvr>
+</p:sld>
+</file>
+
 <file path=ppt/slides/slide9.xml><?xml version="1.0" encoding="utf-8"?>
 <p:sld xmlns:a="http://schemas.openxmlformats.org/drawingml/2006/main" xmlns:r="http://schemas.openxmlformats.org/officeDocument/2006/relationships" xmlns:p="http://schemas.openxmlformats.org/presentationml/2006/main">
   <p:cSld>
@@ -16025,42 +15262,197 @@
           <a:lstStyle/>
           <a:p>
             <a:r>
+              <a:rPr lang="en-US" dirty="0" err="1"/>
+              <a:t>Sql</a:t>
+            </a:r>
+            <a:r>
               <a:rPr lang="en-US" dirty="0"/>
-              <a:t>WHY transactions are important</a:t>
+              <a:t> statement example</a:t>
             </a:r>
           </a:p>
         </p:txBody>
       </p:sp>
-      <p:graphicFrame>
-        <p:nvGraphicFramePr>
-          <p:cNvPr id="5" name="Content Placeholder 4">
+      <p:pic>
+        <p:nvPicPr>
+          <p:cNvPr id="12" name="Picture 11">
             <a:extLst>
               <a:ext uri="{FF2B5EF4-FFF2-40B4-BE49-F238E27FC236}">
-                <a16:creationId xmlns:a16="http://schemas.microsoft.com/office/drawing/2014/main" id="{06CE8F21-4CC9-EDB1-7F51-1F301CE1990D}"/>
+                <a16:creationId xmlns:a16="http://schemas.microsoft.com/office/drawing/2014/main" id="{3A7C58C8-2A77-9A21-71AE-D096152D3A98}"/>
               </a:ext>
             </a:extLst>
           </p:cNvPr>
-          <p:cNvGraphicFramePr>
-            <a:graphicFrameLocks noGrp="1"/>
-          </p:cNvGraphicFramePr>
-          <p:nvPr>
-            <p:ph idx="1"/>
-          </p:nvPr>
-        </p:nvGraphicFramePr>
-        <p:xfrm>
-          <a:off x="581025" y="2181225"/>
-          <a:ext cx="11029950" cy="3678238"/>
-        </p:xfrm>
-        <a:graphic>
-          <a:graphicData uri="http://schemas.openxmlformats.org/drawingml/2006/diagram">
-            <dgm:relIds xmlns:dgm="http://schemas.openxmlformats.org/drawingml/2006/diagram" xmlns:r="http://schemas.openxmlformats.org/officeDocument/2006/relationships" r:dm="rId2" r:lo="rId3" r:qs="rId4" r:cs="rId5"/>
-          </a:graphicData>
-        </a:graphic>
-      </p:graphicFrame>
+          <p:cNvPicPr>
+            <a:picLocks noChangeAspect="1"/>
+          </p:cNvPicPr>
+          <p:nvPr/>
+        </p:nvPicPr>
+        <p:blipFill>
+          <a:blip r:embed="rId2"/>
+          <a:stretch>
+            <a:fillRect/>
+          </a:stretch>
+        </p:blipFill>
+        <p:spPr>
+          <a:xfrm>
+            <a:off x="3101808" y="2399952"/>
+            <a:ext cx="7032752" cy="3230670"/>
+          </a:xfrm>
+          <a:prstGeom prst="rect">
+            <a:avLst/>
+          </a:prstGeom>
+        </p:spPr>
+      </p:pic>
+      <p:sp>
+        <p:nvSpPr>
+          <p:cNvPr id="13" name="Oval 12">
+            <a:extLst>
+              <a:ext uri="{FF2B5EF4-FFF2-40B4-BE49-F238E27FC236}">
+                <a16:creationId xmlns:a16="http://schemas.microsoft.com/office/drawing/2014/main" id="{6467A6F9-F20D-9F49-73BB-4860DCBE093D}"/>
+              </a:ext>
+            </a:extLst>
+          </p:cNvPr>
+          <p:cNvSpPr/>
+          <p:nvPr/>
+        </p:nvSpPr>
+        <p:spPr>
+          <a:xfrm>
+            <a:off x="2698808" y="2886510"/>
+            <a:ext cx="343096" cy="262066"/>
+          </a:xfrm>
+          <a:prstGeom prst="ellipse">
+            <a:avLst/>
+          </a:prstGeom>
+        </p:spPr>
+        <p:style>
+          <a:lnRef idx="2">
+            <a:schemeClr val="accent1">
+              <a:shade val="50000"/>
+            </a:schemeClr>
+          </a:lnRef>
+          <a:fillRef idx="1">
+            <a:schemeClr val="accent1"/>
+          </a:fillRef>
+          <a:effectRef idx="0">
+            <a:schemeClr val="accent1"/>
+          </a:effectRef>
+          <a:fontRef idx="minor">
+            <a:schemeClr val="lt1"/>
+          </a:fontRef>
+        </p:style>
+        <p:txBody>
+          <a:bodyPr rtlCol="0" anchor="ctr"/>
+          <a:lstStyle/>
+          <a:p>
+            <a:pPr algn="ctr"/>
+            <a:r>
+              <a:rPr lang="en-US" dirty="0"/>
+              <a:t>1</a:t>
+            </a:r>
+          </a:p>
+        </p:txBody>
+      </p:sp>
+      <p:sp>
+        <p:nvSpPr>
+          <p:cNvPr id="14" name="Oval 13">
+            <a:extLst>
+              <a:ext uri="{FF2B5EF4-FFF2-40B4-BE49-F238E27FC236}">
+                <a16:creationId xmlns:a16="http://schemas.microsoft.com/office/drawing/2014/main" id="{F55BE5FE-F5C6-C61A-9054-3B9474FCFCB6}"/>
+              </a:ext>
+            </a:extLst>
+          </p:cNvPr>
+          <p:cNvSpPr/>
+          <p:nvPr/>
+        </p:nvSpPr>
+        <p:spPr>
+          <a:xfrm>
+            <a:off x="2698808" y="3669793"/>
+            <a:ext cx="343096" cy="262066"/>
+          </a:xfrm>
+          <a:prstGeom prst="ellipse">
+            <a:avLst/>
+          </a:prstGeom>
+        </p:spPr>
+        <p:style>
+          <a:lnRef idx="2">
+            <a:schemeClr val="accent1">
+              <a:shade val="50000"/>
+            </a:schemeClr>
+          </a:lnRef>
+          <a:fillRef idx="1">
+            <a:schemeClr val="accent1"/>
+          </a:fillRef>
+          <a:effectRef idx="0">
+            <a:schemeClr val="accent1"/>
+          </a:effectRef>
+          <a:fontRef idx="minor">
+            <a:schemeClr val="lt1"/>
+          </a:fontRef>
+        </p:style>
+        <p:txBody>
+          <a:bodyPr rtlCol="0" anchor="ctr"/>
+          <a:lstStyle/>
+          <a:p>
+            <a:pPr algn="ctr"/>
+            <a:r>
+              <a:rPr lang="en-US" dirty="0"/>
+              <a:t>2</a:t>
+            </a:r>
+          </a:p>
+        </p:txBody>
+      </p:sp>
+      <p:sp>
+        <p:nvSpPr>
+          <p:cNvPr id="15" name="Oval 14">
+            <a:extLst>
+              <a:ext uri="{FF2B5EF4-FFF2-40B4-BE49-F238E27FC236}">
+                <a16:creationId xmlns:a16="http://schemas.microsoft.com/office/drawing/2014/main" id="{4DD9E24A-16A1-9E73-C4BB-2E9908FFDD09}"/>
+              </a:ext>
+            </a:extLst>
+          </p:cNvPr>
+          <p:cNvSpPr/>
+          <p:nvPr/>
+        </p:nvSpPr>
+        <p:spPr>
+          <a:xfrm>
+            <a:off x="2698808" y="4457112"/>
+            <a:ext cx="343096" cy="262066"/>
+          </a:xfrm>
+          <a:prstGeom prst="ellipse">
+            <a:avLst/>
+          </a:prstGeom>
+        </p:spPr>
+        <p:style>
+          <a:lnRef idx="2">
+            <a:schemeClr val="accent1">
+              <a:shade val="50000"/>
+            </a:schemeClr>
+          </a:lnRef>
+          <a:fillRef idx="1">
+            <a:schemeClr val="accent1"/>
+          </a:fillRef>
+          <a:effectRef idx="0">
+            <a:schemeClr val="accent1"/>
+          </a:effectRef>
+          <a:fontRef idx="minor">
+            <a:schemeClr val="lt1"/>
+          </a:fontRef>
+        </p:style>
+        <p:txBody>
+          <a:bodyPr rtlCol="0" anchor="ctr"/>
+          <a:lstStyle/>
+          <a:p>
+            <a:pPr algn="ctr"/>
+            <a:r>
+              <a:rPr lang="en-US" dirty="0"/>
+              <a:t>3</a:t>
+            </a:r>
+          </a:p>
+        </p:txBody>
+      </p:sp>
     </p:spTree>
     <p:extLst>
       <p:ext uri="{BB962C8B-B14F-4D97-AF65-F5344CB8AC3E}">
-        <p14:creationId xmlns:p14="http://schemas.microsoft.com/office/powerpoint/2010/main" val="1655837689"/>
+        <p14:creationId xmlns:p14="http://schemas.microsoft.com/office/powerpoint/2010/main" val="798311933"/>
       </p:ext>
     </p:extLst>
   </p:cSld>

</xml_diff>